<commit_message>
update for denver dec 2019
</commit_message>
<xml_diff>
--- a/static/lectures/SSA_Lecture3_Occupancy_Data.pptx
+++ b/static/lectures/SSA_Lecture3_Occupancy_Data.pptx
@@ -256,7 +256,7 @@
           <a:p>
             <a:fld id="{9C255B4B-9E10-4CEE-AA05-4A47B52A875A}" type="datetimeFigureOut">
               <a:rPr lang="en-US" smtClean="0"/>
-              <a:t>12/12/2018</a:t>
+              <a:t>10/6/2019</a:t>
             </a:fld>
             <a:endParaRPr lang="en-US"/>
           </a:p>
@@ -6117,7 +6117,7 @@
           <a:p>
             <a:fld id="{96DCDAD2-BF2B-4B23-962D-FA09F549519F}" type="datetimeFigureOut">
               <a:rPr lang="en-US" smtClean="0"/>
-              <a:t>12/12/2018</a:t>
+              <a:t>10/6/2019</a:t>
             </a:fld>
             <a:endParaRPr lang="en-US"/>
           </a:p>
@@ -6341,7 +6341,7 @@
           <a:p>
             <a:fld id="{96DCDAD2-BF2B-4B23-962D-FA09F549519F}" type="datetimeFigureOut">
               <a:rPr lang="en-US" smtClean="0"/>
-              <a:t>12/12/2018</a:t>
+              <a:t>10/6/2019</a:t>
             </a:fld>
             <a:endParaRPr lang="en-US"/>
           </a:p>
@@ -6881,7 +6881,7 @@
           <a:p>
             <a:fld id="{96DCDAD2-BF2B-4B23-962D-FA09F549519F}" type="datetimeFigureOut">
               <a:rPr lang="en-US" smtClean="0"/>
-              <a:t>12/12/2018</a:t>
+              <a:t>10/6/2019</a:t>
             </a:fld>
             <a:endParaRPr lang="en-US"/>
           </a:p>
@@ -7162,7 +7162,7 @@
           <a:p>
             <a:fld id="{96DCDAD2-BF2B-4B23-962D-FA09F549519F}" type="datetimeFigureOut">
               <a:rPr lang="en-US" smtClean="0"/>
-              <a:t>12/12/2018</a:t>
+              <a:t>10/6/2019</a:t>
             </a:fld>
             <a:endParaRPr lang="en-US"/>
           </a:p>
@@ -7590,7 +7590,7 @@
           <a:p>
             <a:fld id="{96DCDAD2-BF2B-4B23-962D-FA09F549519F}" type="datetimeFigureOut">
               <a:rPr lang="en-US" smtClean="0"/>
-              <a:t>12/12/2018</a:t>
+              <a:t>10/6/2019</a:t>
             </a:fld>
             <a:endParaRPr lang="en-US"/>
           </a:p>
@@ -7747,7 +7747,7 @@
           <a:p>
             <a:fld id="{96DCDAD2-BF2B-4B23-962D-FA09F549519F}" type="datetimeFigureOut">
               <a:rPr lang="en-US" smtClean="0"/>
-              <a:t>12/12/2018</a:t>
+              <a:t>10/6/2019</a:t>
             </a:fld>
             <a:endParaRPr lang="en-US"/>
           </a:p>
@@ -7876,7 +7876,7 @@
           <a:p>
             <a:fld id="{96DCDAD2-BF2B-4B23-962D-FA09F549519F}" type="datetimeFigureOut">
               <a:rPr lang="en-US" smtClean="0"/>
-              <a:t>12/12/2018</a:t>
+              <a:t>10/6/2019</a:t>
             </a:fld>
             <a:endParaRPr lang="en-US"/>
           </a:p>
@@ -8203,7 +8203,7 @@
           <a:p>
             <a:fld id="{96DCDAD2-BF2B-4B23-962D-FA09F549519F}" type="datetimeFigureOut">
               <a:rPr lang="en-US" smtClean="0"/>
-              <a:t>12/12/2018</a:t>
+              <a:t>10/6/2019</a:t>
             </a:fld>
             <a:endParaRPr lang="en-US"/>
           </a:p>
@@ -8510,7 +8510,7 @@
           <a:p>
             <a:fld id="{96DCDAD2-BF2B-4B23-962D-FA09F549519F}" type="datetimeFigureOut">
               <a:rPr lang="en-US" smtClean="0"/>
-              <a:t>12/12/2018</a:t>
+              <a:t>10/6/2019</a:t>
             </a:fld>
             <a:endParaRPr lang="en-US"/>
           </a:p>
@@ -9458,7 +9458,7 @@
         <p:spPr>
           <a:xfrm>
             <a:off x="6681216" y="1341120"/>
-            <a:ext cx="4474464" cy="2677656"/>
+            <a:ext cx="4474464" cy="3108543"/>
           </a:xfrm>
           <a:prstGeom prst="rect">
             <a:avLst/>
@@ -9494,6 +9494,14 @@
             <a:r>
               <a:rPr lang="en-US" sz="2800" dirty="0" err="1"/>
               <a:t>HerpNet</a:t>
+            </a:r>
+            <a:r>
+              <a:rPr lang="en-US" sz="2800" dirty="0"/>
+              <a:t>/</a:t>
+            </a:r>
+            <a:r>
+              <a:rPr lang="en-US" sz="2800" dirty="0" err="1"/>
+              <a:t>iNaturalist</a:t>
             </a:r>
             <a:r>
               <a:rPr lang="en-US" sz="2800" dirty="0"/>
@@ -13278,7 +13286,7 @@
         </p:nvCxnSpPr>
         <p:spPr>
           <a:xfrm>
-            <a:off x="406400" y="2311400"/>
+            <a:off x="1446530" y="2311400"/>
             <a:ext cx="1016000" cy="0"/>
           </a:xfrm>
           <a:prstGeom prst="line">
@@ -13313,7 +13321,7 @@
         </p:nvCxnSpPr>
         <p:spPr>
           <a:xfrm>
-            <a:off x="406400" y="3225800"/>
+            <a:off x="1446530" y="3225800"/>
             <a:ext cx="1016000" cy="0"/>
           </a:xfrm>
           <a:prstGeom prst="line">
@@ -13348,7 +13356,7 @@
         </p:nvCxnSpPr>
         <p:spPr>
           <a:xfrm>
-            <a:off x="406400" y="4038600"/>
+            <a:off x="1446530" y="4038600"/>
             <a:ext cx="1016000" cy="0"/>
           </a:xfrm>
           <a:prstGeom prst="line">
@@ -13383,7 +13391,7 @@
         </p:nvSpPr>
         <p:spPr>
           <a:xfrm>
-            <a:off x="1435101" y="1598215"/>
+            <a:off x="2475231" y="1598215"/>
             <a:ext cx="1574800" cy="420564"/>
           </a:xfrm>
           <a:prstGeom prst="rect">
@@ -13415,7 +13423,7 @@
         </p:nvSpPr>
         <p:spPr>
           <a:xfrm>
-            <a:off x="1435101" y="4290616"/>
+            <a:off x="2475231" y="4290616"/>
             <a:ext cx="1574801" cy="748795"/>
           </a:xfrm>
           <a:prstGeom prst="rect">
@@ -13447,7 +13455,7 @@
         </p:nvSpPr>
         <p:spPr>
           <a:xfrm>
-            <a:off x="3009901" y="1598216"/>
+            <a:off x="4050031" y="1598216"/>
             <a:ext cx="1574800" cy="420564"/>
           </a:xfrm>
           <a:prstGeom prst="rect">
@@ -13479,7 +13487,7 @@
         </p:nvSpPr>
         <p:spPr>
           <a:xfrm>
-            <a:off x="3009901" y="4399995"/>
+            <a:off x="4050031" y="4399995"/>
             <a:ext cx="1574800" cy="420564"/>
           </a:xfrm>
           <a:prstGeom prst="rect">
@@ -13505,77 +13513,13 @@
       </p:sp>
       <p:sp>
         <p:nvSpPr>
-          <p:cNvPr id="35" name="TextBox 34"/>
-          <p:cNvSpPr txBox="1"/>
-          <p:nvPr/>
-        </p:nvSpPr>
-        <p:spPr>
-          <a:xfrm>
-            <a:off x="4584701" y="1614834"/>
-            <a:ext cx="1574800" cy="420564"/>
-          </a:xfrm>
-          <a:prstGeom prst="rect">
-            <a:avLst/>
-          </a:prstGeom>
-          <a:noFill/>
-        </p:spPr>
-        <p:txBody>
-          <a:bodyPr wrap="square" rtlCol="0">
-            <a:spAutoFit/>
-          </a:bodyPr>
-          <a:lstStyle/>
-          <a:p>
-            <a:pPr algn="ctr"/>
-            <a:r>
-              <a:rPr lang="en-US" sz="2133" dirty="0">
-                <a:latin typeface="Calibri" panose="020F0502020204030204" pitchFamily="34" charset="0"/>
-              </a:rPr>
-              <a:t>More useful</a:t>
-            </a:r>
-          </a:p>
-        </p:txBody>
-      </p:sp>
-      <p:sp>
-        <p:nvSpPr>
-          <p:cNvPr id="36" name="TextBox 35"/>
-          <p:cNvSpPr txBox="1"/>
-          <p:nvPr/>
-        </p:nvSpPr>
-        <p:spPr>
-          <a:xfrm>
-            <a:off x="4546600" y="4399996"/>
-            <a:ext cx="1574800" cy="420564"/>
-          </a:xfrm>
-          <a:prstGeom prst="rect">
-            <a:avLst/>
-          </a:prstGeom>
-          <a:noFill/>
-        </p:spPr>
-        <p:txBody>
-          <a:bodyPr wrap="square" rtlCol="0">
-            <a:spAutoFit/>
-          </a:bodyPr>
-          <a:lstStyle/>
-          <a:p>
-            <a:pPr algn="ctr"/>
-            <a:r>
-              <a:rPr lang="en-US" sz="2133" dirty="0">
-                <a:latin typeface="Calibri" panose="020F0502020204030204" pitchFamily="34" charset="0"/>
-              </a:rPr>
-              <a:t>Less useful</a:t>
-            </a:r>
-          </a:p>
-        </p:txBody>
-      </p:sp>
-      <p:sp>
-        <p:nvSpPr>
           <p:cNvPr id="40" name="Down Arrow 39"/>
           <p:cNvSpPr/>
           <p:nvPr/>
         </p:nvSpPr>
         <p:spPr>
           <a:xfrm>
-            <a:off x="2032001" y="2209801"/>
+            <a:off x="3072131" y="2209801"/>
             <a:ext cx="420852" cy="1943100"/>
           </a:xfrm>
           <a:prstGeom prst="downArrow">
@@ -13633,65 +13577,7 @@
         </p:nvSpPr>
         <p:spPr>
           <a:xfrm>
-            <a:off x="3586875" y="2209799"/>
-            <a:ext cx="420852" cy="1943100"/>
-          </a:xfrm>
-          <a:prstGeom prst="downArrow">
-            <a:avLst/>
-          </a:prstGeom>
-          <a:gradFill flip="none" rotWithShape="1">
-            <a:gsLst>
-              <a:gs pos="0">
-                <a:srgbClr val="0070C0"/>
-              </a:gs>
-              <a:gs pos="55000">
-                <a:srgbClr val="92D050"/>
-              </a:gs>
-              <a:gs pos="100000">
-                <a:srgbClr val="FFC000"/>
-              </a:gs>
-            </a:gsLst>
-            <a:lin ang="5400000" scaled="1"/>
-            <a:tileRect/>
-          </a:gradFill>
-          <a:ln>
-            <a:noFill/>
-          </a:ln>
-        </p:spPr>
-        <p:style>
-          <a:lnRef idx="2">
-            <a:schemeClr val="accent1">
-              <a:shade val="50000"/>
-            </a:schemeClr>
-          </a:lnRef>
-          <a:fillRef idx="1">
-            <a:schemeClr val="accent1"/>
-          </a:fillRef>
-          <a:effectRef idx="0">
-            <a:schemeClr val="accent1"/>
-          </a:effectRef>
-          <a:fontRef idx="minor">
-            <a:schemeClr val="lt1"/>
-          </a:fontRef>
-        </p:style>
-        <p:txBody>
-          <a:bodyPr rtlCol="0" anchor="ctr"/>
-          <a:lstStyle/>
-          <a:p>
-            <a:pPr algn="ctr"/>
-            <a:endParaRPr lang="en-US" sz="2400"/>
-          </a:p>
-        </p:txBody>
-      </p:sp>
-      <p:sp>
-        <p:nvSpPr>
-          <p:cNvPr id="42" name="Down Arrow 41"/>
-          <p:cNvSpPr/>
-          <p:nvPr/>
-        </p:nvSpPr>
-        <p:spPr>
-          <a:xfrm>
-            <a:off x="5123574" y="2254250"/>
+            <a:off x="4627005" y="2209799"/>
             <a:ext cx="420852" cy="1943100"/>
           </a:xfrm>
           <a:prstGeom prst="downArrow">
@@ -14189,138 +14075,6 @@
                             </p:childTnLst>
                           </p:cTn>
                         </p:par>
-                        <p:par>
-                          <p:cTn id="38" fill="hold">
-                            <p:stCondLst>
-                              <p:cond delay="2000"/>
-                            </p:stCondLst>
-                            <p:childTnLst>
-                              <p:par>
-                                <p:cTn id="39" presetID="10" presetClass="entr" presetSubtype="0" fill="hold" grpId="0" nodeType="afterEffect">
-                                  <p:stCondLst>
-                                    <p:cond delay="0"/>
-                                  </p:stCondLst>
-                                  <p:childTnLst>
-                                    <p:set>
-                                      <p:cBhvr>
-                                        <p:cTn id="40" dur="1" fill="hold">
-                                          <p:stCondLst>
-                                            <p:cond delay="0"/>
-                                          </p:stCondLst>
-                                        </p:cTn>
-                                        <p:tgtEl>
-                                          <p:spTgt spid="35"/>
-                                        </p:tgtEl>
-                                        <p:attrNameLst>
-                                          <p:attrName>style.visibility</p:attrName>
-                                        </p:attrNameLst>
-                                      </p:cBhvr>
-                                      <p:to>
-                                        <p:strVal val="visible"/>
-                                      </p:to>
-                                    </p:set>
-                                    <p:animEffect transition="in" filter="fade">
-                                      <p:cBhvr>
-                                        <p:cTn id="41" dur="500"/>
-                                        <p:tgtEl>
-                                          <p:spTgt spid="35"/>
-                                        </p:tgtEl>
-                                      </p:cBhvr>
-                                    </p:animEffect>
-                                  </p:childTnLst>
-                                </p:cTn>
-                              </p:par>
-                            </p:childTnLst>
-                          </p:cTn>
-                        </p:par>
-                        <p:par>
-                          <p:cTn id="42" fill="hold">
-                            <p:stCondLst>
-                              <p:cond delay="2500"/>
-                            </p:stCondLst>
-                            <p:childTnLst>
-                              <p:par>
-                                <p:cTn id="43" presetID="10" presetClass="entr" presetSubtype="0" fill="hold" grpId="0" nodeType="afterEffect">
-                                  <p:stCondLst>
-                                    <p:cond delay="0"/>
-                                  </p:stCondLst>
-                                  <p:childTnLst>
-                                    <p:set>
-                                      <p:cBhvr>
-                                        <p:cTn id="44" dur="1" fill="hold">
-                                          <p:stCondLst>
-                                            <p:cond delay="0"/>
-                                          </p:stCondLst>
-                                        </p:cTn>
-                                        <p:tgtEl>
-                                          <p:spTgt spid="42"/>
-                                        </p:tgtEl>
-                                        <p:attrNameLst>
-                                          <p:attrName>style.visibility</p:attrName>
-                                        </p:attrNameLst>
-                                      </p:cBhvr>
-                                      <p:to>
-                                        <p:strVal val="visible"/>
-                                      </p:to>
-                                    </p:set>
-                                    <p:animEffect transition="in" filter="fade">
-                                      <p:cBhvr>
-                                        <p:cTn id="45" dur="500"/>
-                                        <p:tgtEl>
-                                          <p:spTgt spid="42"/>
-                                        </p:tgtEl>
-                                      </p:cBhvr>
-                                    </p:animEffect>
-                                  </p:childTnLst>
-                                </p:cTn>
-                              </p:par>
-                            </p:childTnLst>
-                          </p:cTn>
-                        </p:par>
-                        <p:par>
-                          <p:cTn id="46" fill="hold">
-                            <p:stCondLst>
-                              <p:cond delay="3000"/>
-                            </p:stCondLst>
-                            <p:childTnLst>
-                              <p:par>
-                                <p:cTn id="47" presetID="10" presetClass="entr" presetSubtype="0" fill="hold" grpId="0" nodeType="afterEffect">
-                                  <p:stCondLst>
-                                    <p:cond delay="0"/>
-                                  </p:stCondLst>
-                                  <p:childTnLst>
-                                    <p:set>
-                                      <p:cBhvr>
-                                        <p:cTn id="48" dur="1" fill="hold">
-                                          <p:stCondLst>
-                                            <p:cond delay="0"/>
-                                          </p:stCondLst>
-                                        </p:cTn>
-                                        <p:tgtEl>
-                                          <p:spTgt spid="36"/>
-                                        </p:tgtEl>
-                                        <p:attrNameLst>
-                                          <p:attrName>style.visibility</p:attrName>
-                                        </p:attrNameLst>
-                                      </p:cBhvr>
-                                      <p:to>
-                                        <p:strVal val="visible"/>
-                                      </p:to>
-                                    </p:set>
-                                    <p:animEffect transition="in" filter="fade">
-                                      <p:cBhvr>
-                                        <p:cTn id="49" dur="500"/>
-                                        <p:tgtEl>
-                                          <p:spTgt spid="36"/>
-                                        </p:tgtEl>
-                                      </p:cBhvr>
-                                    </p:animEffect>
-                                  </p:childTnLst>
-                                </p:cTn>
-                              </p:par>
-                            </p:childTnLst>
-                          </p:cTn>
-                        </p:par>
                       </p:childTnLst>
                     </p:cTn>
                   </p:par>
@@ -14351,11 +14105,8 @@
       <p:bldP spid="32" grpId="0"/>
       <p:bldP spid="33" grpId="0"/>
       <p:bldP spid="34" grpId="0"/>
-      <p:bldP spid="35" grpId="0"/>
-      <p:bldP spid="36" grpId="0"/>
       <p:bldP spid="40" grpId="0" animBg="1"/>
       <p:bldP spid="41" grpId="0" animBg="1"/>
-      <p:bldP spid="42" grpId="0" animBg="1"/>
       <p:bldP spid="21" grpId="0" animBg="1"/>
     </p:bldLst>
   </p:timing>
@@ -20447,7 +20198,7 @@
             </a:pPr>
             <a:r>
               <a:rPr lang="en-US" dirty="0"/>
-              <a:t>Example research questions</a:t>
+              <a:t>Example questions</a:t>
             </a:r>
             <a:endParaRPr lang="en-US" dirty="0">
               <a:solidFill>
@@ -23409,9 +23160,7 @@
           <p:cNvGraphicFramePr>
             <a:graphicFrameLocks noGrp="1"/>
           </p:cNvGraphicFramePr>
-          <p:nvPr>
-            <p:extLst/>
-          </p:nvPr>
+          <p:nvPr/>
         </p:nvGraphicFramePr>
         <p:xfrm>
           <a:off x="1524000" y="1295400"/>
@@ -23949,9 +23698,7 @@
           <p:cNvGraphicFramePr>
             <a:graphicFrameLocks noGrp="1"/>
           </p:cNvGraphicFramePr>
-          <p:nvPr>
-            <p:extLst/>
-          </p:nvPr>
+          <p:nvPr/>
         </p:nvGraphicFramePr>
         <p:xfrm>
           <a:off x="7010401" y="1905000"/>
@@ -24401,9 +24148,7 @@
           <p:cNvGraphicFramePr>
             <a:graphicFrameLocks noGrp="1"/>
           </p:cNvGraphicFramePr>
-          <p:nvPr>
-            <p:extLst/>
-          </p:nvPr>
+          <p:nvPr/>
         </p:nvGraphicFramePr>
         <p:xfrm>
           <a:off x="7010401" y="1906078"/>
@@ -24844,9 +24589,7 @@
           <p:cNvGraphicFramePr>
             <a:graphicFrameLocks noGrp="1"/>
           </p:cNvGraphicFramePr>
-          <p:nvPr>
-            <p:extLst/>
-          </p:nvPr>
+          <p:nvPr/>
         </p:nvGraphicFramePr>
         <p:xfrm>
           <a:off x="7010401" y="1905000"/>
@@ -25305,9 +25048,7 @@
           <p:cNvGraphicFramePr>
             <a:graphicFrameLocks noGrp="1"/>
           </p:cNvGraphicFramePr>
-          <p:nvPr>
-            <p:extLst/>
-          </p:nvPr>
+          <p:nvPr/>
         </p:nvGraphicFramePr>
         <p:xfrm>
           <a:off x="7010401" y="1905000"/>
@@ -28857,9 +28598,7 @@
           <p:cNvGraphicFramePr>
             <a:graphicFrameLocks noGrp="1"/>
           </p:cNvGraphicFramePr>
-          <p:nvPr>
-            <p:extLst/>
-          </p:nvPr>
+          <p:nvPr/>
         </p:nvGraphicFramePr>
         <p:xfrm>
           <a:off x="865633" y="2880360"/>
@@ -29634,150 +29373,19 @@
           <a:p>
             <a:r>
               <a:rPr lang="en-US" sz="2800" dirty="0"/>
-              <a:t>Probability the species is not detected if present:</a:t>
+              <a:t>Probability the species is </a:t>
+            </a:r>
+            <a:r>
+              <a:rPr lang="en-US" sz="2800" b="1" dirty="0"/>
+              <a:t>not detected </a:t>
+            </a:r>
+            <a:r>
+              <a:rPr lang="en-US" sz="2800" dirty="0"/>
+              <a:t>if present:</a:t>
             </a:r>
           </a:p>
         </p:txBody>
       </p:sp>
-      <p:sp>
-        <p:nvSpPr>
-          <p:cNvPr id="20" name="TextBox 19">
-            <a:extLst>
-              <a:ext uri="{FF2B5EF4-FFF2-40B4-BE49-F238E27FC236}">
-                <a16:creationId xmlns:a16="http://schemas.microsoft.com/office/drawing/2014/main" id="{EF36BF50-2053-4847-9FF5-5FCF75364236}"/>
-              </a:ext>
-            </a:extLst>
-          </p:cNvPr>
-          <p:cNvSpPr txBox="1"/>
-          <p:nvPr/>
-        </p:nvSpPr>
-        <p:spPr>
-          <a:xfrm>
-            <a:off x="6291072" y="3804871"/>
-            <a:ext cx="5754624" cy="954107"/>
-          </a:xfrm>
-          <a:prstGeom prst="rect">
-            <a:avLst/>
-          </a:prstGeom>
-          <a:noFill/>
-        </p:spPr>
-        <p:txBody>
-          <a:bodyPr wrap="square" rtlCol="0">
-            <a:spAutoFit/>
-          </a:bodyPr>
-          <a:lstStyle/>
-          <a:p>
-            <a:r>
-              <a:rPr lang="en-US" sz="2800" dirty="0"/>
-              <a:t>Probability the species is not detected </a:t>
-            </a:r>
-            <a:r>
-              <a:rPr lang="en-US" sz="2800" b="1" dirty="0"/>
-              <a:t>three times </a:t>
-            </a:r>
-            <a:r>
-              <a:rPr lang="en-US" sz="2800" dirty="0"/>
-              <a:t>if present:</a:t>
-            </a:r>
-          </a:p>
-        </p:txBody>
-      </p:sp>
-      <mc:AlternateContent xmlns:mc="http://schemas.openxmlformats.org/markup-compatibility/2006" xmlns:a14="http://schemas.microsoft.com/office/drawing/2010/main">
-        <mc:Choice Requires="a14">
-          <p:sp>
-            <p:nvSpPr>
-              <p:cNvPr id="23" name="TextBox 22">
-                <a:extLst>
-                  <a:ext uri="{FF2B5EF4-FFF2-40B4-BE49-F238E27FC236}">
-                    <a16:creationId xmlns:a16="http://schemas.microsoft.com/office/drawing/2014/main" id="{5DFD8137-F692-4848-8A93-4859C3EF9D78}"/>
-                  </a:ext>
-                </a:extLst>
-              </p:cNvPr>
-              <p:cNvSpPr txBox="1"/>
-              <p:nvPr/>
-            </p:nvSpPr>
-            <p:spPr>
-              <a:xfrm>
-                <a:off x="7040655" y="4934890"/>
-                <a:ext cx="4460773" cy="492443"/>
-              </a:xfrm>
-              <a:prstGeom prst="rect">
-                <a:avLst/>
-              </a:prstGeom>
-              <a:noFill/>
-            </p:spPr>
-            <p:txBody>
-              <a:bodyPr wrap="none" lIns="0" tIns="0" rIns="0" bIns="0" rtlCol="0">
-                <a:spAutoFit/>
-              </a:bodyPr>
-              <a:lstStyle/>
-              <a:p>
-                <a:pPr/>
-                <a14:m>
-                  <m:oMathPara xmlns:m="http://schemas.openxmlformats.org/officeDocument/2006/math">
-                    <m:oMathParaPr>
-                      <m:jc m:val="centerGroup"/>
-                    </m:oMathParaPr>
-                    <m:oMath xmlns:m="http://schemas.openxmlformats.org/officeDocument/2006/math">
-                      <m:r>
-                        <a:rPr lang="en-US" sz="3200" b="0" i="1" smtClean="0">
-                          <a:latin typeface="Cambria Math" panose="02040503050406030204" pitchFamily="18" charset="0"/>
-                        </a:rPr>
-                        <m:t>0.33∗0.33∗0.33=0.04</m:t>
-                      </m:r>
-                    </m:oMath>
-                  </m:oMathPara>
-                </a14:m>
-                <a:endParaRPr lang="en-US" sz="3200" dirty="0"/>
-              </a:p>
-            </p:txBody>
-          </p:sp>
-        </mc:Choice>
-        <mc:Fallback xmlns="">
-          <p:sp>
-            <p:nvSpPr>
-              <p:cNvPr id="23" name="TextBox 22">
-                <a:extLst>
-                  <a:ext uri="{FF2B5EF4-FFF2-40B4-BE49-F238E27FC236}">
-                    <a16:creationId xmlns:a16="http://schemas.microsoft.com/office/drawing/2014/main" id="{5DFD8137-F692-4848-8A93-4859C3EF9D78}"/>
-                  </a:ext>
-                </a:extLst>
-              </p:cNvPr>
-              <p:cNvSpPr txBox="1">
-                <a:spLocks noRot="1" noChangeAspect="1" noMove="1" noResize="1" noEditPoints="1" noAdjustHandles="1" noChangeArrowheads="1" noChangeShapeType="1" noTextEdit="1"/>
-              </p:cNvSpPr>
-              <p:nvPr/>
-            </p:nvSpPr>
-            <p:spPr>
-              <a:xfrm>
-                <a:off x="7040655" y="4934890"/>
-                <a:ext cx="4460773" cy="492443"/>
-              </a:xfrm>
-              <a:prstGeom prst="rect">
-                <a:avLst/>
-              </a:prstGeom>
-              <a:blipFill>
-                <a:blip r:embed="rId5"/>
-                <a:stretch>
-                  <a:fillRect/>
-                </a:stretch>
-              </a:blipFill>
-            </p:spPr>
-            <p:txBody>
-              <a:bodyPr/>
-              <a:lstStyle/>
-              <a:p>
-                <a:r>
-                  <a:rPr lang="en-US">
-                    <a:noFill/>
-                  </a:rPr>
-                  <a:t> </a:t>
-                </a:r>
-              </a:p>
-            </p:txBody>
-          </p:sp>
-        </mc:Fallback>
-      </mc:AlternateContent>
     </p:spTree>
     <p:extLst>
       <p:ext uri="{BB962C8B-B14F-4D97-AF65-F5344CB8AC3E}">
@@ -31179,9 +30787,7 @@
           <p:cNvGraphicFramePr>
             <a:graphicFrameLocks noGrp="1"/>
           </p:cNvGraphicFramePr>
-          <p:nvPr>
-            <p:extLst/>
-          </p:nvPr>
+          <p:nvPr/>
         </p:nvGraphicFramePr>
         <p:xfrm>
           <a:off x="2605697" y="2450068"/>
@@ -33549,8 +33155,8 @@
           </p:nvSpPr>
           <p:spPr>
             <a:xfrm>
-              <a:off x="4574309" y="3639126"/>
-              <a:ext cx="406400" cy="461665"/>
+              <a:off x="4089400" y="3604151"/>
+              <a:ext cx="1193799" cy="461665"/>
             </a:xfrm>
             <a:prstGeom prst="rect">
               <a:avLst/>
@@ -33563,9 +33169,10 @@
             </a:bodyPr>
             <a:lstStyle/>
             <a:p>
+              <a:pPr algn="ctr"/>
               <a:r>
                 <a:rPr lang="en-US" sz="2400" dirty="0"/>
-                <a:t>P</a:t>
+                <a:t>1 - E</a:t>
               </a:r>
             </a:p>
           </p:txBody>
@@ -34013,8 +33620,8 @@
           </p:nvSpPr>
           <p:spPr>
             <a:xfrm>
-              <a:off x="7416800" y="2740967"/>
-              <a:ext cx="406400" cy="461665"/>
+              <a:off x="7315028" y="2717303"/>
+              <a:ext cx="910128" cy="461665"/>
             </a:xfrm>
             <a:prstGeom prst="rect">
               <a:avLst/>
@@ -34029,7 +33636,7 @@
             <a:p>
               <a:r>
                 <a:rPr lang="en-US" sz="2400" dirty="0"/>
-                <a:t>P</a:t>
+                <a:t>1 - E</a:t>
               </a:r>
             </a:p>
           </p:txBody>
@@ -35201,10 +34808,10 @@
       </p:graphicFrame>
       <p:sp>
         <p:nvSpPr>
-          <p:cNvPr id="6" name="Rectangle 5">
+          <p:cNvPr id="34" name="Rectangle 33">
             <a:extLst>
               <a:ext uri="{FF2B5EF4-FFF2-40B4-BE49-F238E27FC236}">
-                <a16:creationId xmlns:a16="http://schemas.microsoft.com/office/drawing/2014/main" id="{5843A962-3601-45C7-8F0D-5F8D098D9013}"/>
+                <a16:creationId xmlns:a16="http://schemas.microsoft.com/office/drawing/2014/main" id="{C8E00377-9A07-47D3-9547-15717DC23831}"/>
               </a:ext>
             </a:extLst>
           </p:cNvPr>
@@ -35213,8 +34820,8 @@
         </p:nvSpPr>
         <p:spPr>
           <a:xfrm>
-            <a:off x="1962912" y="1719072"/>
-            <a:ext cx="2353056" cy="353568"/>
+            <a:off x="4880610" y="1719072"/>
+            <a:ext cx="2995424" cy="353568"/>
           </a:xfrm>
           <a:prstGeom prst="rect">
             <a:avLst/>
@@ -35250,10 +34857,10 @@
       </p:sp>
       <p:sp>
         <p:nvSpPr>
-          <p:cNvPr id="34" name="Rectangle 33">
+          <p:cNvPr id="7" name="Rectangle 6">
             <a:extLst>
               <a:ext uri="{FF2B5EF4-FFF2-40B4-BE49-F238E27FC236}">
-                <a16:creationId xmlns:a16="http://schemas.microsoft.com/office/drawing/2014/main" id="{C8E00377-9A07-47D3-9547-15717DC23831}"/>
+                <a16:creationId xmlns:a16="http://schemas.microsoft.com/office/drawing/2014/main" id="{28B10761-0372-4021-950F-00962E1F8FCF}"/>
               </a:ext>
             </a:extLst>
           </p:cNvPr>
@@ -35262,8 +34869,8 @@
         </p:nvSpPr>
         <p:spPr>
           <a:xfrm>
-            <a:off x="5248656" y="1719072"/>
-            <a:ext cx="2353056" cy="353568"/>
+            <a:off x="8153400" y="1690795"/>
+            <a:ext cx="2995424" cy="353568"/>
           </a:xfrm>
           <a:prstGeom prst="rect">
             <a:avLst/>
@@ -35299,10 +34906,10 @@
       </p:sp>
       <p:sp>
         <p:nvSpPr>
-          <p:cNvPr id="35" name="Rectangle 34">
+          <p:cNvPr id="8" name="Rectangle 7">
             <a:extLst>
               <a:ext uri="{FF2B5EF4-FFF2-40B4-BE49-F238E27FC236}">
-                <a16:creationId xmlns:a16="http://schemas.microsoft.com/office/drawing/2014/main" id="{8DB0A23A-D75F-4562-8EF6-55CAF8E66BE8}"/>
+                <a16:creationId xmlns:a16="http://schemas.microsoft.com/office/drawing/2014/main" id="{A50595AB-972F-4B36-8B3E-D49AC058A732}"/>
               </a:ext>
             </a:extLst>
           </p:cNvPr>
@@ -35311,8 +34918,8 @@
         </p:nvSpPr>
         <p:spPr>
           <a:xfrm>
-            <a:off x="8442960" y="1719072"/>
-            <a:ext cx="2353056" cy="353568"/>
+            <a:off x="1607820" y="1690795"/>
+            <a:ext cx="2995424" cy="353568"/>
           </a:xfrm>
           <a:prstGeom prst="rect">
             <a:avLst/>

</xml_diff>